<commit_message>
Posted create table on powerpoint
</commit_message>
<xml_diff>
--- a/Presentation_and_FinalReport/Edu-Solutions.pptx
+++ b/Presentation_and_FinalReport/Edu-Solutions.pptx
@@ -868,7 +868,7 @@
             <a:fld id="{B61BEF0D-F0BB-DE4B-95CE-6DB70DBA9567}" type="datetimeFigureOut">
               <a:rPr lang="en-US" dirty="0"/>
               <a:pPr/>
-              <a:t>5/8/2017</a:t>
+              <a:t>5/9/2017</a:t>
             </a:fld>
             <a:endParaRPr lang="en-US" dirty="0"/>
           </a:p>
@@ -1116,7 +1116,7 @@
             <a:fld id="{B61BEF0D-F0BB-DE4B-95CE-6DB70DBA9567}" type="datetimeFigureOut">
               <a:rPr lang="en-US" dirty="0"/>
               <a:pPr/>
-              <a:t>5/8/2017</a:t>
+              <a:t>5/9/2017</a:t>
             </a:fld>
             <a:endParaRPr lang="en-US" dirty="0"/>
           </a:p>
@@ -1427,7 +1427,7 @@
             <a:fld id="{B61BEF0D-F0BB-DE4B-95CE-6DB70DBA9567}" type="datetimeFigureOut">
               <a:rPr lang="en-US" dirty="0"/>
               <a:pPr/>
-              <a:t>5/8/2017</a:t>
+              <a:t>5/9/2017</a:t>
             </a:fld>
             <a:endParaRPr lang="en-US" dirty="0"/>
           </a:p>
@@ -1757,7 +1757,7 @@
             <a:fld id="{B61BEF0D-F0BB-DE4B-95CE-6DB70DBA9567}" type="datetimeFigureOut">
               <a:rPr lang="en-US" dirty="0"/>
               <a:pPr/>
-              <a:t>5/8/2017</a:t>
+              <a:t>5/9/2017</a:t>
             </a:fld>
             <a:endParaRPr lang="en-US" dirty="0"/>
           </a:p>
@@ -2068,7 +2068,7 @@
             <a:fld id="{B61BEF0D-F0BB-DE4B-95CE-6DB70DBA9567}" type="datetimeFigureOut">
               <a:rPr lang="en-US" dirty="0"/>
               <a:pPr/>
-              <a:t>5/8/2017</a:t>
+              <a:t>5/9/2017</a:t>
             </a:fld>
             <a:endParaRPr lang="en-US" dirty="0"/>
           </a:p>
@@ -2458,7 +2458,7 @@
             <a:fld id="{B61BEF0D-F0BB-DE4B-95CE-6DB70DBA9567}" type="datetimeFigureOut">
               <a:rPr lang="en-US" dirty="0"/>
               <a:pPr/>
-              <a:t>5/8/2017</a:t>
+              <a:t>5/9/2017</a:t>
             </a:fld>
             <a:endParaRPr lang="en-US" dirty="0"/>
           </a:p>
@@ -2624,7 +2624,7 @@
           <a:p>
             <a:fld id="{55C6B4A9-1611-4792-9094-5F34BCA07E0B}" type="datetimeFigureOut">
               <a:rPr lang="en-US" dirty="0"/>
-              <a:t>5/8/2017</a:t>
+              <a:t>5/9/2017</a:t>
             </a:fld>
             <a:endParaRPr lang="en-US" dirty="0"/>
           </a:p>
@@ -2800,7 +2800,7 @@
             <a:fld id="{B61BEF0D-F0BB-DE4B-95CE-6DB70DBA9567}" type="datetimeFigureOut">
               <a:rPr lang="en-US" dirty="0"/>
               <a:pPr/>
-              <a:t>5/8/2017</a:t>
+              <a:t>5/9/2017</a:t>
             </a:fld>
             <a:endParaRPr lang="en-US" dirty="0"/>
           </a:p>
@@ -2966,7 +2966,7 @@
           <a:p>
             <a:fld id="{42A54C80-263E-416B-A8E0-580EDEADCBDC}" type="datetimeFigureOut">
               <a:rPr lang="en-US" dirty="0"/>
-              <a:t>5/8/2017</a:t>
+              <a:t>5/9/2017</a:t>
             </a:fld>
             <a:endParaRPr lang="en-US" dirty="0"/>
           </a:p>
@@ -3209,7 +3209,7 @@
             <a:fld id="{B61BEF0D-F0BB-DE4B-95CE-6DB70DBA9567}" type="datetimeFigureOut">
               <a:rPr lang="en-US" dirty="0"/>
               <a:pPr/>
-              <a:t>5/8/2017</a:t>
+              <a:t>5/9/2017</a:t>
             </a:fld>
             <a:endParaRPr lang="en-US" dirty="0"/>
           </a:p>
@@ -3437,7 +3437,7 @@
           <a:p>
             <a:fld id="{42A54C80-263E-416B-A8E0-580EDEADCBDC}" type="datetimeFigureOut">
               <a:rPr lang="en-US" dirty="0"/>
-              <a:t>5/8/2017</a:t>
+              <a:t>5/9/2017</a:t>
             </a:fld>
             <a:endParaRPr lang="en-US" dirty="0"/>
           </a:p>
@@ -3807,7 +3807,7 @@
             <a:fld id="{B61BEF0D-F0BB-DE4B-95CE-6DB70DBA9567}" type="datetimeFigureOut">
               <a:rPr lang="en-US" dirty="0"/>
               <a:pPr/>
-              <a:t>5/8/2017</a:t>
+              <a:t>5/9/2017</a:t>
             </a:fld>
             <a:endParaRPr lang="en-US" dirty="0"/>
           </a:p>
@@ -3927,7 +3927,7 @@
             <a:fld id="{B61BEF0D-F0BB-DE4B-95CE-6DB70DBA9567}" type="datetimeFigureOut">
               <a:rPr lang="en-US" dirty="0"/>
               <a:pPr/>
-              <a:t>5/8/2017</a:t>
+              <a:t>5/9/2017</a:t>
             </a:fld>
             <a:endParaRPr lang="en-US" dirty="0"/>
           </a:p>
@@ -4019,7 +4019,7 @@
             <a:fld id="{B61BEF0D-F0BB-DE4B-95CE-6DB70DBA9567}" type="datetimeFigureOut">
               <a:rPr lang="en-US" dirty="0"/>
               <a:pPr/>
-              <a:t>5/8/2017</a:t>
+              <a:t>5/9/2017</a:t>
             </a:fld>
             <a:endParaRPr lang="en-US" dirty="0"/>
           </a:p>
@@ -4270,7 +4270,7 @@
           <a:p>
             <a:fld id="{42A54C80-263E-416B-A8E0-580EDEADCBDC}" type="datetimeFigureOut">
               <a:rPr lang="en-US" dirty="0"/>
-              <a:t>5/8/2017</a:t>
+              <a:t>5/9/2017</a:t>
             </a:fld>
             <a:endParaRPr lang="en-US" dirty="0"/>
           </a:p>
@@ -4572,7 +4572,7 @@
             <a:fld id="{B61BEF0D-F0BB-DE4B-95CE-6DB70DBA9567}" type="datetimeFigureOut">
               <a:rPr lang="en-US" dirty="0"/>
               <a:pPr/>
-              <a:t>5/8/2017</a:t>
+              <a:t>5/9/2017</a:t>
             </a:fld>
             <a:endParaRPr lang="en-US" dirty="0"/>
           </a:p>
@@ -5270,7 +5270,7 @@
             <a:fld id="{B61BEF0D-F0BB-DE4B-95CE-6DB70DBA9567}" type="datetimeFigureOut">
               <a:rPr lang="en-US" dirty="0"/>
               <a:pPr/>
-              <a:t>5/8/2017</a:t>
+              <a:t>5/9/2017</a:t>
             </a:fld>
             <a:endParaRPr lang="en-US" dirty="0"/>
           </a:p>
@@ -6855,10 +6855,82 @@
           <a:bodyPr/>
           <a:lstStyle/>
           <a:p>
-            <a:endParaRPr lang="en-US"/>
-          </a:p>
-        </p:txBody>
-      </p:sp>
+            <a:endParaRPr lang="en-US" dirty="0"/>
+          </a:p>
+        </p:txBody>
+      </p:sp>
+      <p:pic>
+        <p:nvPicPr>
+          <p:cNvPr id="4" name="Picture 3"/>
+          <p:cNvPicPr>
+            <a:picLocks noChangeAspect="1"/>
+          </p:cNvPicPr>
+          <p:nvPr/>
+        </p:nvPicPr>
+        <p:blipFill>
+          <a:blip r:embed="rId2"/>
+          <a:stretch>
+            <a:fillRect/>
+          </a:stretch>
+        </p:blipFill>
+        <p:spPr>
+          <a:xfrm>
+            <a:off x="0" y="1552575"/>
+            <a:ext cx="4714875" cy="5305425"/>
+          </a:xfrm>
+          <a:prstGeom prst="rect">
+            <a:avLst/>
+          </a:prstGeom>
+        </p:spPr>
+      </p:pic>
+      <p:pic>
+        <p:nvPicPr>
+          <p:cNvPr id="6" name="Picture 5"/>
+          <p:cNvPicPr>
+            <a:picLocks noChangeAspect="1"/>
+          </p:cNvPicPr>
+          <p:nvPr/>
+        </p:nvPicPr>
+        <p:blipFill>
+          <a:blip r:embed="rId3"/>
+          <a:stretch>
+            <a:fillRect/>
+          </a:stretch>
+        </p:blipFill>
+        <p:spPr>
+          <a:xfrm>
+            <a:off x="3769469" y="1552575"/>
+            <a:ext cx="4037541" cy="4997515"/>
+          </a:xfrm>
+          <a:prstGeom prst="rect">
+            <a:avLst/>
+          </a:prstGeom>
+        </p:spPr>
+      </p:pic>
+      <p:pic>
+        <p:nvPicPr>
+          <p:cNvPr id="7" name="Picture 6"/>
+          <p:cNvPicPr>
+            <a:picLocks noChangeAspect="1"/>
+          </p:cNvPicPr>
+          <p:nvPr/>
+        </p:nvPicPr>
+        <p:blipFill>
+          <a:blip r:embed="rId4"/>
+          <a:stretch>
+            <a:fillRect/>
+          </a:stretch>
+        </p:blipFill>
+        <p:spPr>
+          <a:xfrm>
+            <a:off x="7807010" y="1552574"/>
+            <a:ext cx="4229100" cy="5305425"/>
+          </a:xfrm>
+          <a:prstGeom prst="rect">
+            <a:avLst/>
+          </a:prstGeom>
+        </p:spPr>
+      </p:pic>
     </p:spTree>
     <p:extLst>
       <p:ext uri="{BB962C8B-B14F-4D97-AF65-F5344CB8AC3E}">

</xml_diff>